<commit_message>
Add PDFs of final slides
</commit_message>
<xml_diff>
--- a/Slides/Lesson 7.1 Testing UIs.pptx
+++ b/Slides/Lesson 7.1 Testing UIs.pptx
@@ -240,7 +240,7 @@
           <a:p>
             <a:fld id="{7C7E5181-6CF5-45F7-A87A-E0E0B1FD7549}" type="datetimeFigureOut">
               <a:rPr lang="en-US" smtClean="0"/>
-              <a:t>2/24/22</a:t>
+              <a:t>2/27/22</a:t>
             </a:fld>
             <a:endParaRPr lang="en-US"/>
           </a:p>
@@ -2927,7 +2927,7 @@
           <a:p>
             <a:fld id="{5D2A64DE-480B-420F-9649-4F8E696E08E0}" type="datetime1">
               <a:rPr lang="en-US" smtClean="0"/>
-              <a:t>2/24/22</a:t>
+              <a:t>2/27/22</a:t>
             </a:fld>
             <a:endParaRPr lang="en-US"/>
           </a:p>
@@ -3161,7 +3161,7 @@
           <a:p>
             <a:fld id="{0D3616D0-8311-4107-9726-6B805E7D05BA}" type="datetime1">
               <a:rPr lang="en-US" smtClean="0"/>
-              <a:t>2/24/22</a:t>
+              <a:t>2/27/22</a:t>
             </a:fld>
             <a:endParaRPr lang="en-US"/>
           </a:p>
@@ -3369,7 +3369,7 @@
           <a:p>
             <a:fld id="{3BC2557A-5C88-417A-A763-5AC779462A5F}" type="datetime1">
               <a:rPr lang="en-US" smtClean="0"/>
-              <a:t>2/24/22</a:t>
+              <a:t>2/27/22</a:t>
             </a:fld>
             <a:endParaRPr lang="en-US"/>
           </a:p>
@@ -3899,7 +3899,7 @@
           <a:p>
             <a:fld id="{07C7BFD4-467E-4EDE-93EA-052F5B39A4E5}" type="datetime1">
               <a:rPr lang="en-US" smtClean="0"/>
-              <a:t>2/24/22</a:t>
+              <a:t>2/27/22</a:t>
             </a:fld>
             <a:endParaRPr lang="en-US"/>
           </a:p>
@@ -4213,7 +4213,7 @@
           <a:p>
             <a:fld id="{A533CBE2-D5BE-47AC-ADC2-9CDFC1D0CF90}" type="datetime1">
               <a:rPr lang="en-US" smtClean="0"/>
-              <a:t>2/24/22</a:t>
+              <a:t>2/27/22</a:t>
             </a:fld>
             <a:endParaRPr lang="en-US"/>
           </a:p>
@@ -4516,7 +4516,7 @@
           <a:p>
             <a:fld id="{39B7EDB1-CE74-4951-85A2-0B01C2128E28}" type="datetime1">
               <a:rPr lang="en-US" smtClean="0"/>
-              <a:t>2/24/22</a:t>
+              <a:t>2/27/22</a:t>
             </a:fld>
             <a:endParaRPr lang="en-US"/>
           </a:p>
@@ -4965,7 +4965,7 @@
           <a:p>
             <a:fld id="{2BC7EB92-A5C2-4807-A9DC-9EDE6CBFB241}" type="datetime1">
               <a:rPr lang="en-US" smtClean="0"/>
-              <a:t>2/24/22</a:t>
+              <a:t>2/27/22</a:t>
             </a:fld>
             <a:endParaRPr lang="en-US"/>
           </a:p>
@@ -5112,7 +5112,7 @@
           <a:p>
             <a:fld id="{109E55A0-C911-4F03-82FC-7E5926047D46}" type="datetime1">
               <a:rPr lang="en-US" smtClean="0"/>
-              <a:t>2/24/22</a:t>
+              <a:t>2/27/22</a:t>
             </a:fld>
             <a:endParaRPr lang="en-US"/>
           </a:p>
@@ -5261,7 +5261,7 @@
           <a:p>
             <a:fld id="{2B7B7EE0-7771-4CD5-9B2B-3550753A54A1}" type="datetime1">
               <a:rPr lang="en-US" smtClean="0"/>
-              <a:t>2/24/22</a:t>
+              <a:t>2/27/22</a:t>
             </a:fld>
             <a:endParaRPr lang="en-US"/>
           </a:p>
@@ -5572,7 +5572,7 @@
           <a:p>
             <a:fld id="{F8B318B3-0E87-4416-A9B8-D891968C2727}" type="datetime1">
               <a:rPr lang="en-US" smtClean="0"/>
-              <a:t>2/24/22</a:t>
+              <a:t>2/27/22</a:t>
             </a:fld>
             <a:endParaRPr lang="en-US"/>
           </a:p>
@@ -5863,7 +5863,7 @@
           <a:p>
             <a:fld id="{EA476A42-A091-4468-A075-64A31BE59948}" type="datetime1">
               <a:rPr lang="en-US" smtClean="0"/>
-              <a:t>2/24/22</a:t>
+              <a:t>2/27/22</a:t>
             </a:fld>
             <a:endParaRPr lang="en-US"/>
           </a:p>
@@ -6106,7 +6106,7 @@
           <a:p>
             <a:fld id="{54D997E8-DDEE-43F1-8D9B-F8A1E11DE488}" type="datetime1">
               <a:rPr lang="en-US" smtClean="0"/>
-              <a:t>2/24/22</a:t>
+              <a:t>2/27/22</a:t>
             </a:fld>
             <a:endParaRPr lang="en-US"/>
           </a:p>
@@ -19805,8 +19805,8 @@
         </p:nvSpPr>
         <p:spPr>
           <a:xfrm>
-            <a:off x="914400" y="3523129"/>
-            <a:ext cx="4034118" cy="1477328"/>
+            <a:off x="145773" y="5153146"/>
+            <a:ext cx="5711687" cy="646331"/>
           </a:xfrm>
           <a:prstGeom prst="rect">
             <a:avLst/>
@@ -19849,7 +19849,7 @@
                   <a:schemeClr val="tx1"/>
                 </a:solidFill>
               </a:rPr>
-              <a:t>TODO: Finalize activity, include zip in website, add link to it here. Activity currently in git (WITH SOLUTION): </a:t>
+              <a:t>Download the activity handout: Linked on course web page for week 7, or at: </a:t>
             </a:r>
             <a:r>
               <a:rPr lang="en-US" dirty="0">
@@ -19858,16 +19858,13 @@
                 </a:solidFill>
                 <a:hlinkClick r:id="rId5"/>
               </a:rPr>
-              <a:t>https://github.com/neu-se/react-todo-app-with-tests</a:t>
-            </a:r>
-            <a:r>
-              <a:rPr lang="en-US" dirty="0">
-                <a:solidFill>
-                  <a:schemeClr val="tx1"/>
-                </a:solidFill>
-              </a:rPr>
-              <a:t> </a:t>
-            </a:r>
+              <a:t>https://bit.ly/3JV08Lw</a:t>
+            </a:r>
+            <a:endParaRPr lang="en-US" dirty="0">
+              <a:solidFill>
+                <a:schemeClr val="tx1"/>
+              </a:solidFill>
+            </a:endParaRPr>
           </a:p>
         </p:txBody>
       </p:sp>

</xml_diff>

<commit_message>
fixed typos in FindBy example
</commit_message>
<xml_diff>
--- a/Slides/Lesson 7.1 Testing UIs.pptx
+++ b/Slides/Lesson 7.1 Testing UIs.pptx
@@ -44,15 +44,22 @@
       <p:boldItalic r:id="rId30"/>
     </p:embeddedFont>
     <p:embeddedFont>
+      <p:font typeface="Helvetica" panose="020B0604020202020204" pitchFamily="34" charset="0"/>
+      <p:regular r:id="rId31"/>
+      <p:bold r:id="rId32"/>
+      <p:italic r:id="rId33"/>
+      <p:boldItalic r:id="rId34"/>
+    </p:embeddedFont>
+    <p:embeddedFont>
       <p:font typeface="Ink Free" panose="03080402000500000000" pitchFamily="66" charset="0"/>
-      <p:regular r:id="rId31"/>
+      <p:regular r:id="rId35"/>
     </p:embeddedFont>
     <p:embeddedFont>
       <p:font typeface="Verdana" panose="020B0604030504040204" pitchFamily="34" charset="0"/>
-      <p:regular r:id="rId32"/>
-      <p:bold r:id="rId33"/>
-      <p:italic r:id="rId34"/>
-      <p:boldItalic r:id="rId35"/>
+      <p:regular r:id="rId36"/>
+      <p:bold r:id="rId37"/>
+      <p:italic r:id="rId38"/>
+      <p:boldItalic r:id="rId39"/>
     </p:embeddedFont>
   </p:embeddedFontLst>
   <p:defaultTextStyle>
@@ -240,7 +247,7 @@
           <a:p>
             <a:fld id="{7C7E5181-6CF5-45F7-A87A-E0E0B1FD7549}" type="datetimeFigureOut">
               <a:rPr lang="en-US" smtClean="0"/>
-              <a:t>2/27/22</a:t>
+              <a:t>2/27/2022</a:t>
             </a:fld>
             <a:endParaRPr lang="en-US"/>
           </a:p>
@@ -2927,7 +2934,7 @@
           <a:p>
             <a:fld id="{5D2A64DE-480B-420F-9649-4F8E696E08E0}" type="datetime1">
               <a:rPr lang="en-US" smtClean="0"/>
-              <a:t>2/27/22</a:t>
+              <a:t>2/27/2022</a:t>
             </a:fld>
             <a:endParaRPr lang="en-US"/>
           </a:p>
@@ -3161,7 +3168,7 @@
           <a:p>
             <a:fld id="{0D3616D0-8311-4107-9726-6B805E7D05BA}" type="datetime1">
               <a:rPr lang="en-US" smtClean="0"/>
-              <a:t>2/27/22</a:t>
+              <a:t>2/27/2022</a:t>
             </a:fld>
             <a:endParaRPr lang="en-US"/>
           </a:p>
@@ -3369,7 +3376,7 @@
           <a:p>
             <a:fld id="{3BC2557A-5C88-417A-A763-5AC779462A5F}" type="datetime1">
               <a:rPr lang="en-US" smtClean="0"/>
-              <a:t>2/27/22</a:t>
+              <a:t>2/27/2022</a:t>
             </a:fld>
             <a:endParaRPr lang="en-US"/>
           </a:p>
@@ -3899,7 +3906,7 @@
           <a:p>
             <a:fld id="{07C7BFD4-467E-4EDE-93EA-052F5B39A4E5}" type="datetime1">
               <a:rPr lang="en-US" smtClean="0"/>
-              <a:t>2/27/22</a:t>
+              <a:t>2/27/2022</a:t>
             </a:fld>
             <a:endParaRPr lang="en-US"/>
           </a:p>
@@ -4213,7 +4220,7 @@
           <a:p>
             <a:fld id="{A533CBE2-D5BE-47AC-ADC2-9CDFC1D0CF90}" type="datetime1">
               <a:rPr lang="en-US" smtClean="0"/>
-              <a:t>2/27/22</a:t>
+              <a:t>2/27/2022</a:t>
             </a:fld>
             <a:endParaRPr lang="en-US"/>
           </a:p>
@@ -4516,7 +4523,7 @@
           <a:p>
             <a:fld id="{39B7EDB1-CE74-4951-85A2-0B01C2128E28}" type="datetime1">
               <a:rPr lang="en-US" smtClean="0"/>
-              <a:t>2/27/22</a:t>
+              <a:t>2/27/2022</a:t>
             </a:fld>
             <a:endParaRPr lang="en-US"/>
           </a:p>
@@ -4965,7 +4972,7 @@
           <a:p>
             <a:fld id="{2BC7EB92-A5C2-4807-A9DC-9EDE6CBFB241}" type="datetime1">
               <a:rPr lang="en-US" smtClean="0"/>
-              <a:t>2/27/22</a:t>
+              <a:t>2/27/2022</a:t>
             </a:fld>
             <a:endParaRPr lang="en-US"/>
           </a:p>
@@ -5112,7 +5119,7 @@
           <a:p>
             <a:fld id="{109E55A0-C911-4F03-82FC-7E5926047D46}" type="datetime1">
               <a:rPr lang="en-US" smtClean="0"/>
-              <a:t>2/27/22</a:t>
+              <a:t>2/27/2022</a:t>
             </a:fld>
             <a:endParaRPr lang="en-US"/>
           </a:p>
@@ -5261,7 +5268,7 @@
           <a:p>
             <a:fld id="{2B7B7EE0-7771-4CD5-9B2B-3550753A54A1}" type="datetime1">
               <a:rPr lang="en-US" smtClean="0"/>
-              <a:t>2/27/22</a:t>
+              <a:t>2/27/2022</a:t>
             </a:fld>
             <a:endParaRPr lang="en-US"/>
           </a:p>
@@ -5572,7 +5579,7 @@
           <a:p>
             <a:fld id="{F8B318B3-0E87-4416-A9B8-D891968C2727}" type="datetime1">
               <a:rPr lang="en-US" smtClean="0"/>
-              <a:t>2/27/22</a:t>
+              <a:t>2/27/2022</a:t>
             </a:fld>
             <a:endParaRPr lang="en-US"/>
           </a:p>
@@ -5863,7 +5870,7 @@
           <a:p>
             <a:fld id="{EA476A42-A091-4468-A075-64A31BE59948}" type="datetime1">
               <a:rPr lang="en-US" smtClean="0"/>
-              <a:t>2/27/22</a:t>
+              <a:t>2/27/2022</a:t>
             </a:fld>
             <a:endParaRPr lang="en-US"/>
           </a:p>
@@ -6106,7 +6113,7 @@
           <a:p>
             <a:fld id="{54D997E8-DDEE-43F1-8D9B-F8A1E11DE488}" type="datetime1">
               <a:rPr lang="en-US" smtClean="0"/>
-              <a:t>2/27/22</a:t>
+              <a:t>2/27/2022</a:t>
             </a:fld>
             <a:endParaRPr lang="en-US"/>
           </a:p>
@@ -18694,8 +18701,8 @@
         </p:nvSpPr>
         <p:spPr>
           <a:xfrm>
-            <a:off x="309284" y="1669334"/>
-            <a:ext cx="11497234" cy="3970318"/>
+            <a:off x="309284" y="1681691"/>
+            <a:ext cx="11497234" cy="4247317"/>
           </a:xfrm>
           <a:prstGeom prst="rect">
             <a:avLst/>
@@ -19356,7 +19363,114 @@
                 </a:solidFill>
                 <a:latin typeface="Courier" pitchFamily="2" charset="0"/>
               </a:rPr>
-              <a:t>  </a:t>
+              <a:t>  const </a:t>
+            </a:r>
+            <a:r>
+              <a:rPr lang="en-US" dirty="0" err="1">
+                <a:solidFill>
+                  <a:srgbClr val="000000"/>
+                </a:solidFill>
+                <a:latin typeface="Courier" pitchFamily="2" charset="0"/>
+              </a:rPr>
+              <a:t>todoItem</a:t>
+            </a:r>
+            <a:r>
+              <a:rPr lang="en-US" dirty="0">
+                <a:solidFill>
+                  <a:srgbClr val="000000"/>
+                </a:solidFill>
+                <a:latin typeface="Courier" pitchFamily="2" charset="0"/>
+              </a:rPr>
+              <a:t> = await </a:t>
+            </a:r>
+            <a:r>
+              <a:rPr lang="en-US" dirty="0" err="1">
+                <a:solidFill>
+                  <a:srgbClr val="377170"/>
+                </a:solidFill>
+                <a:latin typeface="Courier" pitchFamily="2" charset="0"/>
+              </a:rPr>
+              <a:t>renderedComponent</a:t>
+            </a:r>
+            <a:r>
+              <a:rPr lang="en-US" dirty="0" err="1">
+                <a:solidFill>
+                  <a:srgbClr val="000000"/>
+                </a:solidFill>
+                <a:latin typeface="Courier" pitchFamily="2" charset="0"/>
+              </a:rPr>
+              <a:t>.</a:t>
+            </a:r>
+            <a:r>
+              <a:rPr lang="en-US" i="1" dirty="0" err="1">
+                <a:solidFill>
+                  <a:srgbClr val="000000"/>
+                </a:solidFill>
+                <a:latin typeface="Courier" pitchFamily="2" charset="0"/>
+              </a:rPr>
+              <a:t>findByTestId</a:t>
+            </a:r>
+            <a:r>
+              <a:rPr lang="en-US" dirty="0">
+                <a:solidFill>
+                  <a:srgbClr val="000000"/>
+                </a:solidFill>
+                <a:latin typeface="Courier" pitchFamily="2" charset="0"/>
+              </a:rPr>
+              <a:t>(</a:t>
+            </a:r>
+            <a:r>
+              <a:rPr lang="en-US" b="1" dirty="0">
+                <a:solidFill>
+                  <a:srgbClr val="0F7003"/>
+                </a:solidFill>
+                <a:latin typeface="Courier" pitchFamily="2" charset="0"/>
+              </a:rPr>
+              <a:t>"</a:t>
+            </a:r>
+            <a:r>
+              <a:rPr lang="en-US" b="1" dirty="0" err="1">
+                <a:solidFill>
+                  <a:srgbClr val="0F7003"/>
+                </a:solidFill>
+                <a:latin typeface="Courier" pitchFamily="2" charset="0"/>
+              </a:rPr>
+              <a:t>todoItem</a:t>
+            </a:r>
+            <a:r>
+              <a:rPr lang="en-US" b="1" dirty="0">
+                <a:solidFill>
+                  <a:srgbClr val="0F7003"/>
+                </a:solidFill>
+                <a:latin typeface="Courier" pitchFamily="2" charset="0"/>
+              </a:rPr>
+              <a:t>"</a:t>
+            </a:r>
+            <a:r>
+              <a:rPr lang="en-US" dirty="0">
+                <a:solidFill>
+                  <a:srgbClr val="000000"/>
+                </a:solidFill>
+                <a:latin typeface="Courier" pitchFamily="2" charset="0"/>
+              </a:rPr>
+              <a:t>);</a:t>
+            </a:r>
+            <a:br>
+              <a:rPr lang="en-US" dirty="0">
+                <a:solidFill>
+                  <a:srgbClr val="000000"/>
+                </a:solidFill>
+                <a:latin typeface="Courier" pitchFamily="2" charset="0"/>
+              </a:rPr>
+            </a:br>
+            <a:r>
+              <a:rPr lang="en-US" dirty="0">
+                <a:solidFill>
+                  <a:srgbClr val="000000"/>
+                </a:solidFill>
+                <a:latin typeface="Courier" pitchFamily="2" charset="0"/>
+              </a:rPr>
+              <a:t>  </a:t>
             </a:r>
             <a:r>
               <a:rPr lang="en-US" b="1" i="1" dirty="0">
@@ -19379,29 +19493,29 @@
             <a:r>
               <a:rPr lang="en-US" dirty="0" err="1">
                 <a:solidFill>
-                  <a:srgbClr val="377170"/>
-                </a:solidFill>
-                <a:latin typeface="Courier" pitchFamily="2" charset="0"/>
-              </a:rPr>
-              <a:t>renderedComponent</a:t>
+                  <a:srgbClr val="000000"/>
+                </a:solidFill>
+                <a:latin typeface="Courier" pitchFamily="2" charset="0"/>
+              </a:rPr>
+              <a:t>todoItem</a:t>
+            </a:r>
+            <a:r>
+              <a:rPr lang="en-US" dirty="0">
+                <a:solidFill>
+                  <a:srgbClr val="000000"/>
+                </a:solidFill>
+                <a:latin typeface="Courier" pitchFamily="2" charset="0"/>
+              </a:rPr>
+              <a:t>).</a:t>
             </a:r>
             <a:r>
               <a:rPr lang="en-US" dirty="0" err="1">
                 <a:solidFill>
-                  <a:srgbClr val="000000"/>
-                </a:solidFill>
-                <a:latin typeface="Courier" pitchFamily="2" charset="0"/>
-              </a:rPr>
-              <a:t>.</a:t>
-            </a:r>
-            <a:r>
-              <a:rPr lang="en-US" i="1" dirty="0" err="1">
-                <a:solidFill>
-                  <a:srgbClr val="000000"/>
-                </a:solidFill>
-                <a:latin typeface="Courier" pitchFamily="2" charset="0"/>
-              </a:rPr>
-              <a:t>findByTestId</a:t>
+                  <a:srgbClr val="676834"/>
+                </a:solidFill>
+                <a:latin typeface="Courier" pitchFamily="2" charset="0"/>
+              </a:rPr>
+              <a:t>toHaveTextContent</a:t>
             </a:r>
             <a:r>
               <a:rPr lang="en-US" dirty="0">
@@ -19412,6 +19526,17 @@
               </a:rPr>
               <a:t>(</a:t>
             </a:r>
+          </a:p>
+          <a:p>
+            <a:r>
+              <a:rPr lang="en-US" dirty="0">
+                <a:solidFill>
+                  <a:srgbClr val="000000"/>
+                </a:solidFill>
+                <a:latin typeface="Courier" pitchFamily="2" charset="0"/>
+              </a:rPr>
+              <a:t>  	</a:t>
+            </a:r>
             <a:r>
               <a:rPr lang="en-US" b="1" dirty="0">
                 <a:solidFill>
@@ -19419,79 +19544,8 @@
                 </a:solidFill>
                 <a:latin typeface="Courier" pitchFamily="2" charset="0"/>
               </a:rPr>
-              <a:t>"</a:t>
-            </a:r>
-            <a:r>
-              <a:rPr lang="en-US" b="1" dirty="0" err="1">
-                <a:solidFill>
-                  <a:srgbClr val="0F7003"/>
-                </a:solidFill>
-                <a:latin typeface="Courier" pitchFamily="2" charset="0"/>
-              </a:rPr>
-              <a:t>todoItem</a:t>
-            </a:r>
-            <a:r>
-              <a:rPr lang="en-US" b="1" dirty="0">
-                <a:solidFill>
-                  <a:srgbClr val="0F7003"/>
-                </a:solidFill>
-                <a:latin typeface="Courier" pitchFamily="2" charset="0"/>
-              </a:rPr>
-              <a:t>"</a:t>
-            </a:r>
-            <a:r>
-              <a:rPr lang="en-US" dirty="0">
-                <a:solidFill>
-                  <a:srgbClr val="000000"/>
-                </a:solidFill>
-                <a:latin typeface="Courier" pitchFamily="2" charset="0"/>
-              </a:rPr>
-              <a:t>)).</a:t>
-            </a:r>
-            <a:r>
-              <a:rPr lang="en-US" dirty="0" err="1">
-                <a:solidFill>
-                  <a:srgbClr val="676834"/>
-                </a:solidFill>
-                <a:latin typeface="Courier" pitchFamily="2" charset="0"/>
-              </a:rPr>
-              <a:t>toHaveTextContent</a:t>
-            </a:r>
-            <a:r>
-              <a:rPr lang="en-US" dirty="0">
-                <a:solidFill>
-                  <a:srgbClr val="000000"/>
-                </a:solidFill>
-                <a:latin typeface="Courier" pitchFamily="2" charset="0"/>
-              </a:rPr>
-              <a:t>(</a:t>
-            </a:r>
-          </a:p>
-          <a:p>
-            <a:r>
-              <a:rPr lang="en-US" dirty="0">
-                <a:solidFill>
-                  <a:srgbClr val="000000"/>
-                </a:solidFill>
-                <a:latin typeface="Courier" pitchFamily="2" charset="0"/>
-              </a:rPr>
-              <a:t>    </a:t>
-            </a:r>
-            <a:r>
-              <a:rPr lang="en-US" b="1" dirty="0">
-                <a:solidFill>
-                  <a:srgbClr val="0F7003"/>
-                </a:solidFill>
-                <a:latin typeface="Courier" pitchFamily="2" charset="0"/>
-              </a:rPr>
-              <a:t>"Write a better test input"</a:t>
-            </a:r>
-            <a:endParaRPr lang="en-US" dirty="0">
-              <a:solidFill>
-                <a:srgbClr val="0F7003"/>
-              </a:solidFill>
-              <a:latin typeface="Courier" pitchFamily="2" charset="0"/>
-            </a:endParaRPr>
+              <a:t>"Write a better test input“</a:t>
+            </a:r>
           </a:p>
           <a:p>
             <a:r>

</xml_diff>